<commit_message>
Update UAV interaction images and presentation
Replaced the PNG and PPTX files for fixed-time stochastic learning from human-UAV interaction with state-input constraints to reflect updated visuals and presentation content.
</commit_message>
<xml_diff>
--- a/images/Fixed-time stochastic learning from human-UAV interaction with state-input constraints.pptx
+++ b/images/Fixed-time stochastic learning from human-UAV interaction with state-input constraints.pptx
@@ -2,12 +2,12 @@
 <file path=ppt/presentation.xml><?xml version="1.0" encoding="utf-8"?>
 <p:presentation xmlns:a="http://schemas.openxmlformats.org/drawingml/2006/main" xmlns:r="http://schemas.openxmlformats.org/officeDocument/2006/relationships" xmlns:p="http://schemas.openxmlformats.org/presentationml/2006/main" saveSubsetFonts="1" autoCompressPictures="0">
   <p:sldMasterIdLst>
-    <p:sldMasterId id="2147483696" r:id="rId1"/>
+    <p:sldMasterId id="2147483708" r:id="rId1"/>
   </p:sldMasterIdLst>
   <p:sldIdLst>
     <p:sldId id="256" r:id="rId2"/>
   </p:sldIdLst>
-  <p:sldSz cx="10080625" cy="5040313"/>
+  <p:sldSz cx="10080625" cy="5759450"/>
   <p:notesSz cx="6858000" cy="9144000"/>
   <p:defaultTextStyle>
     <a:defPPr>
@@ -104,6 +104,11 @@
       </a:defRPr>
     </a:lvl9pPr>
   </p:defaultTextStyle>
+  <p:extLst>
+    <p:ext uri="{EFAFB233-063F-42B5-8137-9DF3F51BA10A}">
+      <p15:sldGuideLst xmlns:p15="http://schemas.microsoft.com/office/powerpoint/2012/main"/>
+    </p:ext>
+  </p:extLst>
 </p:presentation>
 </file>
 
@@ -136,15 +141,15 @@
         </p:nvSpPr>
         <p:spPr>
           <a:xfrm>
-            <a:off x="1260078" y="824885"/>
-            <a:ext cx="7560469" cy="1754776"/>
+            <a:off x="1260078" y="942577"/>
+            <a:ext cx="7560469" cy="2005142"/>
           </a:xfrm>
         </p:spPr>
         <p:txBody>
           <a:bodyPr anchor="b"/>
           <a:lstStyle>
             <a:lvl1pPr algn="ctr">
-              <a:defRPr sz="4410"/>
+              <a:defRPr sz="4961"/>
             </a:lvl1pPr>
           </a:lstStyle>
           <a:p>
@@ -168,8 +173,8 @@
         </p:nvSpPr>
         <p:spPr>
           <a:xfrm>
-            <a:off x="1260078" y="2647331"/>
-            <a:ext cx="7560469" cy="1216909"/>
+            <a:off x="1260078" y="3025045"/>
+            <a:ext cx="7560469" cy="1390533"/>
           </a:xfrm>
         </p:spPr>
         <p:txBody>
@@ -177,39 +182,39 @@
           <a:lstStyle>
             <a:lvl1pPr marL="0" indent="0" algn="ctr">
               <a:buNone/>
-              <a:defRPr sz="1764"/>
+              <a:defRPr sz="1984"/>
             </a:lvl1pPr>
-            <a:lvl2pPr marL="336042" indent="0" algn="ctr">
-              <a:buNone/>
-              <a:defRPr sz="1470"/>
+            <a:lvl2pPr marL="378013" indent="0" algn="ctr">
+              <a:buNone/>
+              <a:defRPr sz="1654"/>
             </a:lvl2pPr>
-            <a:lvl3pPr marL="672084" indent="0" algn="ctr">
+            <a:lvl3pPr marL="756026" indent="0" algn="ctr">
+              <a:buNone/>
+              <a:defRPr sz="1488"/>
+            </a:lvl3pPr>
+            <a:lvl4pPr marL="1134039" indent="0" algn="ctr">
               <a:buNone/>
               <a:defRPr sz="1323"/>
-            </a:lvl3pPr>
-            <a:lvl4pPr marL="1008126" indent="0" algn="ctr">
-              <a:buNone/>
-              <a:defRPr sz="1176"/>
             </a:lvl4pPr>
-            <a:lvl5pPr marL="1344168" indent="0" algn="ctr">
-              <a:buNone/>
-              <a:defRPr sz="1176"/>
+            <a:lvl5pPr marL="1512052" indent="0" algn="ctr">
+              <a:buNone/>
+              <a:defRPr sz="1323"/>
             </a:lvl5pPr>
-            <a:lvl6pPr marL="1680210" indent="0" algn="ctr">
-              <a:buNone/>
-              <a:defRPr sz="1176"/>
+            <a:lvl6pPr marL="1890065" indent="0" algn="ctr">
+              <a:buNone/>
+              <a:defRPr sz="1323"/>
             </a:lvl6pPr>
-            <a:lvl7pPr marL="2016252" indent="0" algn="ctr">
-              <a:buNone/>
-              <a:defRPr sz="1176"/>
+            <a:lvl7pPr marL="2268078" indent="0" algn="ctr">
+              <a:buNone/>
+              <a:defRPr sz="1323"/>
             </a:lvl7pPr>
-            <a:lvl8pPr marL="2352294" indent="0" algn="ctr">
-              <a:buNone/>
-              <a:defRPr sz="1176"/>
+            <a:lvl8pPr marL="2646091" indent="0" algn="ctr">
+              <a:buNone/>
+              <a:defRPr sz="1323"/>
             </a:lvl8pPr>
-            <a:lvl9pPr marL="2688336" indent="0" algn="ctr">
-              <a:buNone/>
-              <a:defRPr sz="1176"/>
+            <a:lvl9pPr marL="3024104" indent="0" algn="ctr">
+              <a:buNone/>
+              <a:defRPr sz="1323"/>
             </a:lvl9pPr>
           </a:lstStyle>
           <a:p>
@@ -289,7 +294,7 @@
     </p:spTree>
     <p:extLst>
       <p:ext uri="{BB962C8B-B14F-4D97-AF65-F5344CB8AC3E}">
-        <p14:creationId xmlns:p14="http://schemas.microsoft.com/office/powerpoint/2010/main" val="796458954"/>
+        <p14:creationId xmlns:p14="http://schemas.microsoft.com/office/powerpoint/2010/main" val="3726805757"/>
       </p:ext>
     </p:extLst>
   </p:cSld>
@@ -459,7 +464,7 @@
     </p:spTree>
     <p:extLst>
       <p:ext uri="{BB962C8B-B14F-4D97-AF65-F5344CB8AC3E}">
-        <p14:creationId xmlns:p14="http://schemas.microsoft.com/office/powerpoint/2010/main" val="3081696172"/>
+        <p14:creationId xmlns:p14="http://schemas.microsoft.com/office/powerpoint/2010/main" val="3802584819"/>
       </p:ext>
     </p:extLst>
   </p:cSld>
@@ -498,8 +503,8 @@
         </p:nvSpPr>
         <p:spPr>
           <a:xfrm>
-            <a:off x="7213947" y="268350"/>
-            <a:ext cx="2173635" cy="4271432"/>
+            <a:off x="7213947" y="306637"/>
+            <a:ext cx="2173635" cy="4880868"/>
           </a:xfrm>
         </p:spPr>
         <p:txBody>
@@ -526,8 +531,8 @@
         </p:nvSpPr>
         <p:spPr>
           <a:xfrm>
-            <a:off x="693043" y="268350"/>
-            <a:ext cx="6394896" cy="4271432"/>
+            <a:off x="693043" y="306637"/>
+            <a:ext cx="6394896" cy="4880868"/>
           </a:xfrm>
         </p:spPr>
         <p:txBody>
@@ -639,7 +644,7 @@
     </p:spTree>
     <p:extLst>
       <p:ext uri="{BB962C8B-B14F-4D97-AF65-F5344CB8AC3E}">
-        <p14:creationId xmlns:p14="http://schemas.microsoft.com/office/powerpoint/2010/main" val="2158877774"/>
+        <p14:creationId xmlns:p14="http://schemas.microsoft.com/office/powerpoint/2010/main" val="2083412845"/>
       </p:ext>
     </p:extLst>
   </p:cSld>
@@ -809,7 +814,7 @@
     </p:spTree>
     <p:extLst>
       <p:ext uri="{BB962C8B-B14F-4D97-AF65-F5344CB8AC3E}">
-        <p14:creationId xmlns:p14="http://schemas.microsoft.com/office/powerpoint/2010/main" val="201620850"/>
+        <p14:creationId xmlns:p14="http://schemas.microsoft.com/office/powerpoint/2010/main" val="2521213043"/>
       </p:ext>
     </p:extLst>
   </p:cSld>
@@ -848,15 +853,15 @@
         </p:nvSpPr>
         <p:spPr>
           <a:xfrm>
-            <a:off x="687793" y="1256579"/>
-            <a:ext cx="8694539" cy="2096630"/>
+            <a:off x="687793" y="1435864"/>
+            <a:ext cx="8694539" cy="2395771"/>
           </a:xfrm>
         </p:spPr>
         <p:txBody>
           <a:bodyPr anchor="b"/>
           <a:lstStyle>
             <a:lvl1pPr>
-              <a:defRPr sz="4410"/>
+              <a:defRPr sz="4961"/>
             </a:lvl1pPr>
           </a:lstStyle>
           <a:p>
@@ -880,8 +885,8 @@
         </p:nvSpPr>
         <p:spPr>
           <a:xfrm>
-            <a:off x="687793" y="3373044"/>
-            <a:ext cx="8694539" cy="1102568"/>
+            <a:off x="687793" y="3854300"/>
+            <a:ext cx="8694539" cy="1259879"/>
           </a:xfrm>
         </p:spPr>
         <p:txBody>
@@ -889,7 +894,7 @@
           <a:lstStyle>
             <a:lvl1pPr marL="0" indent="0">
               <a:buNone/>
-              <a:defRPr sz="1764">
+              <a:defRPr sz="1984">
                 <a:solidFill>
                   <a:schemeClr val="tx1">
                     <a:tint val="75000"/>
@@ -897,9 +902,9 @@
                 </a:solidFill>
               </a:defRPr>
             </a:lvl1pPr>
-            <a:lvl2pPr marL="336042" indent="0">
-              <a:buNone/>
-              <a:defRPr sz="1470">
+            <a:lvl2pPr marL="378013" indent="0">
+              <a:buNone/>
+              <a:defRPr sz="1654">
                 <a:solidFill>
                   <a:schemeClr val="tx1">
                     <a:tint val="75000"/>
@@ -907,7 +912,17 @@
                 </a:solidFill>
               </a:defRPr>
             </a:lvl2pPr>
-            <a:lvl3pPr marL="672084" indent="0">
+            <a:lvl3pPr marL="756026" indent="0">
+              <a:buNone/>
+              <a:defRPr sz="1488">
+                <a:solidFill>
+                  <a:schemeClr val="tx1">
+                    <a:tint val="75000"/>
+                  </a:schemeClr>
+                </a:solidFill>
+              </a:defRPr>
+            </a:lvl3pPr>
+            <a:lvl4pPr marL="1134039" indent="0">
               <a:buNone/>
               <a:defRPr sz="1323">
                 <a:solidFill>
@@ -916,20 +931,10 @@
                   </a:schemeClr>
                 </a:solidFill>
               </a:defRPr>
-            </a:lvl3pPr>
-            <a:lvl4pPr marL="1008126" indent="0">
-              <a:buNone/>
-              <a:defRPr sz="1176">
-                <a:solidFill>
-                  <a:schemeClr val="tx1">
-                    <a:tint val="75000"/>
-                  </a:schemeClr>
-                </a:solidFill>
-              </a:defRPr>
             </a:lvl4pPr>
-            <a:lvl5pPr marL="1344168" indent="0">
-              <a:buNone/>
-              <a:defRPr sz="1176">
+            <a:lvl5pPr marL="1512052" indent="0">
+              <a:buNone/>
+              <a:defRPr sz="1323">
                 <a:solidFill>
                   <a:schemeClr val="tx1">
                     <a:tint val="75000"/>
@@ -937,9 +942,9 @@
                 </a:solidFill>
               </a:defRPr>
             </a:lvl5pPr>
-            <a:lvl6pPr marL="1680210" indent="0">
-              <a:buNone/>
-              <a:defRPr sz="1176">
+            <a:lvl6pPr marL="1890065" indent="0">
+              <a:buNone/>
+              <a:defRPr sz="1323">
                 <a:solidFill>
                   <a:schemeClr val="tx1">
                     <a:tint val="75000"/>
@@ -947,9 +952,9 @@
                 </a:solidFill>
               </a:defRPr>
             </a:lvl6pPr>
-            <a:lvl7pPr marL="2016252" indent="0">
-              <a:buNone/>
-              <a:defRPr sz="1176">
+            <a:lvl7pPr marL="2268078" indent="0">
+              <a:buNone/>
+              <a:defRPr sz="1323">
                 <a:solidFill>
                   <a:schemeClr val="tx1">
                     <a:tint val="75000"/>
@@ -957,9 +962,9 @@
                 </a:solidFill>
               </a:defRPr>
             </a:lvl7pPr>
-            <a:lvl8pPr marL="2352294" indent="0">
-              <a:buNone/>
-              <a:defRPr sz="1176">
+            <a:lvl8pPr marL="2646091" indent="0">
+              <a:buNone/>
+              <a:defRPr sz="1323">
                 <a:solidFill>
                   <a:schemeClr val="tx1">
                     <a:tint val="75000"/>
@@ -967,9 +972,9 @@
                 </a:solidFill>
               </a:defRPr>
             </a:lvl8pPr>
-            <a:lvl9pPr marL="2688336" indent="0">
-              <a:buNone/>
-              <a:defRPr sz="1176">
+            <a:lvl9pPr marL="3024104" indent="0">
+              <a:buNone/>
+              <a:defRPr sz="1323">
                 <a:solidFill>
                   <a:schemeClr val="tx1">
                     <a:tint val="75000"/>
@@ -1055,7 +1060,7 @@
     </p:spTree>
     <p:extLst>
       <p:ext uri="{BB962C8B-B14F-4D97-AF65-F5344CB8AC3E}">
-        <p14:creationId xmlns:p14="http://schemas.microsoft.com/office/powerpoint/2010/main" val="2155367559"/>
+        <p14:creationId xmlns:p14="http://schemas.microsoft.com/office/powerpoint/2010/main" val="2040216921"/>
       </p:ext>
     </p:extLst>
   </p:cSld>
@@ -1117,8 +1122,8 @@
         </p:nvSpPr>
         <p:spPr>
           <a:xfrm>
-            <a:off x="693043" y="1341750"/>
-            <a:ext cx="4284266" cy="3198032"/>
+            <a:off x="693043" y="1533187"/>
+            <a:ext cx="4284266" cy="3654318"/>
           </a:xfrm>
         </p:spPr>
         <p:txBody>
@@ -1174,8 +1179,8 @@
         </p:nvSpPr>
         <p:spPr>
           <a:xfrm>
-            <a:off x="5103316" y="1341750"/>
-            <a:ext cx="4284266" cy="3198032"/>
+            <a:off x="5103316" y="1533187"/>
+            <a:ext cx="4284266" cy="3654318"/>
           </a:xfrm>
         </p:spPr>
         <p:txBody>
@@ -1287,7 +1292,7 @@
     </p:spTree>
     <p:extLst>
       <p:ext uri="{BB962C8B-B14F-4D97-AF65-F5344CB8AC3E}">
-        <p14:creationId xmlns:p14="http://schemas.microsoft.com/office/powerpoint/2010/main" val="2982469100"/>
+        <p14:creationId xmlns:p14="http://schemas.microsoft.com/office/powerpoint/2010/main" val="453154807"/>
       </p:ext>
     </p:extLst>
   </p:cSld>
@@ -1326,8 +1331,8 @@
         </p:nvSpPr>
         <p:spPr>
           <a:xfrm>
-            <a:off x="694356" y="268350"/>
-            <a:ext cx="8694539" cy="974228"/>
+            <a:off x="694356" y="306638"/>
+            <a:ext cx="8694539" cy="1113227"/>
           </a:xfrm>
         </p:spPr>
         <p:txBody>
@@ -1354,8 +1359,8 @@
         </p:nvSpPr>
         <p:spPr>
           <a:xfrm>
-            <a:off x="694357" y="1235577"/>
-            <a:ext cx="4264576" cy="605537"/>
+            <a:off x="694357" y="1411865"/>
+            <a:ext cx="4264576" cy="691934"/>
           </a:xfrm>
         </p:spPr>
         <p:txBody>
@@ -1363,39 +1368,39 @@
           <a:lstStyle>
             <a:lvl1pPr marL="0" indent="0">
               <a:buNone/>
-              <a:defRPr sz="1764" b="1"/>
+              <a:defRPr sz="1984" b="1"/>
             </a:lvl1pPr>
-            <a:lvl2pPr marL="336042" indent="0">
-              <a:buNone/>
-              <a:defRPr sz="1470" b="1"/>
+            <a:lvl2pPr marL="378013" indent="0">
+              <a:buNone/>
+              <a:defRPr sz="1654" b="1"/>
             </a:lvl2pPr>
-            <a:lvl3pPr marL="672084" indent="0">
+            <a:lvl3pPr marL="756026" indent="0">
+              <a:buNone/>
+              <a:defRPr sz="1488" b="1"/>
+            </a:lvl3pPr>
+            <a:lvl4pPr marL="1134039" indent="0">
               <a:buNone/>
               <a:defRPr sz="1323" b="1"/>
-            </a:lvl3pPr>
-            <a:lvl4pPr marL="1008126" indent="0">
-              <a:buNone/>
-              <a:defRPr sz="1176" b="1"/>
             </a:lvl4pPr>
-            <a:lvl5pPr marL="1344168" indent="0">
-              <a:buNone/>
-              <a:defRPr sz="1176" b="1"/>
+            <a:lvl5pPr marL="1512052" indent="0">
+              <a:buNone/>
+              <a:defRPr sz="1323" b="1"/>
             </a:lvl5pPr>
-            <a:lvl6pPr marL="1680210" indent="0">
-              <a:buNone/>
-              <a:defRPr sz="1176" b="1"/>
+            <a:lvl6pPr marL="1890065" indent="0">
+              <a:buNone/>
+              <a:defRPr sz="1323" b="1"/>
             </a:lvl6pPr>
-            <a:lvl7pPr marL="2016252" indent="0">
-              <a:buNone/>
-              <a:defRPr sz="1176" b="1"/>
+            <a:lvl7pPr marL="2268078" indent="0">
+              <a:buNone/>
+              <a:defRPr sz="1323" b="1"/>
             </a:lvl7pPr>
-            <a:lvl8pPr marL="2352294" indent="0">
-              <a:buNone/>
-              <a:defRPr sz="1176" b="1"/>
+            <a:lvl8pPr marL="2646091" indent="0">
+              <a:buNone/>
+              <a:defRPr sz="1323" b="1"/>
             </a:lvl8pPr>
-            <a:lvl9pPr marL="2688336" indent="0">
-              <a:buNone/>
-              <a:defRPr sz="1176" b="1"/>
+            <a:lvl9pPr marL="3024104" indent="0">
+              <a:buNone/>
+              <a:defRPr sz="1323" b="1"/>
             </a:lvl9pPr>
           </a:lstStyle>
           <a:p>
@@ -1419,8 +1424,8 @@
         </p:nvSpPr>
         <p:spPr>
           <a:xfrm>
-            <a:off x="694357" y="1841114"/>
-            <a:ext cx="4264576" cy="2708002"/>
+            <a:off x="694357" y="2103799"/>
+            <a:ext cx="4264576" cy="3094372"/>
           </a:xfrm>
         </p:spPr>
         <p:txBody>
@@ -1476,8 +1481,8 @@
         </p:nvSpPr>
         <p:spPr>
           <a:xfrm>
-            <a:off x="5103316" y="1235577"/>
-            <a:ext cx="4285579" cy="605537"/>
+            <a:off x="5103316" y="1411865"/>
+            <a:ext cx="4285579" cy="691934"/>
           </a:xfrm>
         </p:spPr>
         <p:txBody>
@@ -1485,39 +1490,39 @@
           <a:lstStyle>
             <a:lvl1pPr marL="0" indent="0">
               <a:buNone/>
-              <a:defRPr sz="1764" b="1"/>
+              <a:defRPr sz="1984" b="1"/>
             </a:lvl1pPr>
-            <a:lvl2pPr marL="336042" indent="0">
-              <a:buNone/>
-              <a:defRPr sz="1470" b="1"/>
+            <a:lvl2pPr marL="378013" indent="0">
+              <a:buNone/>
+              <a:defRPr sz="1654" b="1"/>
             </a:lvl2pPr>
-            <a:lvl3pPr marL="672084" indent="0">
+            <a:lvl3pPr marL="756026" indent="0">
+              <a:buNone/>
+              <a:defRPr sz="1488" b="1"/>
+            </a:lvl3pPr>
+            <a:lvl4pPr marL="1134039" indent="0">
               <a:buNone/>
               <a:defRPr sz="1323" b="1"/>
-            </a:lvl3pPr>
-            <a:lvl4pPr marL="1008126" indent="0">
-              <a:buNone/>
-              <a:defRPr sz="1176" b="1"/>
             </a:lvl4pPr>
-            <a:lvl5pPr marL="1344168" indent="0">
-              <a:buNone/>
-              <a:defRPr sz="1176" b="1"/>
+            <a:lvl5pPr marL="1512052" indent="0">
+              <a:buNone/>
+              <a:defRPr sz="1323" b="1"/>
             </a:lvl5pPr>
-            <a:lvl6pPr marL="1680210" indent="0">
-              <a:buNone/>
-              <a:defRPr sz="1176" b="1"/>
+            <a:lvl6pPr marL="1890065" indent="0">
+              <a:buNone/>
+              <a:defRPr sz="1323" b="1"/>
             </a:lvl6pPr>
-            <a:lvl7pPr marL="2016252" indent="0">
-              <a:buNone/>
-              <a:defRPr sz="1176" b="1"/>
+            <a:lvl7pPr marL="2268078" indent="0">
+              <a:buNone/>
+              <a:defRPr sz="1323" b="1"/>
             </a:lvl7pPr>
-            <a:lvl8pPr marL="2352294" indent="0">
-              <a:buNone/>
-              <a:defRPr sz="1176" b="1"/>
+            <a:lvl8pPr marL="2646091" indent="0">
+              <a:buNone/>
+              <a:defRPr sz="1323" b="1"/>
             </a:lvl8pPr>
-            <a:lvl9pPr marL="2688336" indent="0">
-              <a:buNone/>
-              <a:defRPr sz="1176" b="1"/>
+            <a:lvl9pPr marL="3024104" indent="0">
+              <a:buNone/>
+              <a:defRPr sz="1323" b="1"/>
             </a:lvl9pPr>
           </a:lstStyle>
           <a:p>
@@ -1541,8 +1546,8 @@
         </p:nvSpPr>
         <p:spPr>
           <a:xfrm>
-            <a:off x="5103316" y="1841114"/>
-            <a:ext cx="4285579" cy="2708002"/>
+            <a:off x="5103316" y="2103799"/>
+            <a:ext cx="4285579" cy="3094372"/>
           </a:xfrm>
         </p:spPr>
         <p:txBody>
@@ -1654,7 +1659,7 @@
     </p:spTree>
     <p:extLst>
       <p:ext uri="{BB962C8B-B14F-4D97-AF65-F5344CB8AC3E}">
-        <p14:creationId xmlns:p14="http://schemas.microsoft.com/office/powerpoint/2010/main" val="2156745855"/>
+        <p14:creationId xmlns:p14="http://schemas.microsoft.com/office/powerpoint/2010/main" val="1646949731"/>
       </p:ext>
     </p:extLst>
   </p:cSld>
@@ -1772,7 +1777,7 @@
     </p:spTree>
     <p:extLst>
       <p:ext uri="{BB962C8B-B14F-4D97-AF65-F5344CB8AC3E}">
-        <p14:creationId xmlns:p14="http://schemas.microsoft.com/office/powerpoint/2010/main" val="2130554257"/>
+        <p14:creationId xmlns:p14="http://schemas.microsoft.com/office/powerpoint/2010/main" val="2028647869"/>
       </p:ext>
     </p:extLst>
   </p:cSld>
@@ -1867,7 +1872,7 @@
     </p:spTree>
     <p:extLst>
       <p:ext uri="{BB962C8B-B14F-4D97-AF65-F5344CB8AC3E}">
-        <p14:creationId xmlns:p14="http://schemas.microsoft.com/office/powerpoint/2010/main" val="3125575952"/>
+        <p14:creationId xmlns:p14="http://schemas.microsoft.com/office/powerpoint/2010/main" val="2782677688"/>
       </p:ext>
     </p:extLst>
   </p:cSld>
@@ -1906,15 +1911,15 @@
         </p:nvSpPr>
         <p:spPr>
           <a:xfrm>
-            <a:off x="694356" y="336021"/>
-            <a:ext cx="3251264" cy="1176073"/>
+            <a:off x="694356" y="383963"/>
+            <a:ext cx="3251264" cy="1343872"/>
           </a:xfrm>
         </p:spPr>
         <p:txBody>
           <a:bodyPr anchor="b"/>
           <a:lstStyle>
             <a:lvl1pPr>
-              <a:defRPr sz="2352"/>
+              <a:defRPr sz="2646"/>
             </a:lvl1pPr>
           </a:lstStyle>
           <a:p>
@@ -1938,39 +1943,39 @@
         </p:nvSpPr>
         <p:spPr>
           <a:xfrm>
-            <a:off x="4285579" y="725712"/>
-            <a:ext cx="5103316" cy="3581889"/>
+            <a:off x="4285579" y="829255"/>
+            <a:ext cx="5103316" cy="4092942"/>
           </a:xfrm>
         </p:spPr>
         <p:txBody>
           <a:bodyPr/>
           <a:lstStyle>
             <a:lvl1pPr>
-              <a:defRPr sz="2352"/>
+              <a:defRPr sz="2646"/>
             </a:lvl1pPr>
             <a:lvl2pPr>
-              <a:defRPr sz="2058"/>
+              <a:defRPr sz="2315"/>
             </a:lvl2pPr>
             <a:lvl3pPr>
-              <a:defRPr sz="1764"/>
+              <a:defRPr sz="1984"/>
             </a:lvl3pPr>
             <a:lvl4pPr>
-              <a:defRPr sz="1470"/>
+              <a:defRPr sz="1654"/>
             </a:lvl4pPr>
             <a:lvl5pPr>
-              <a:defRPr sz="1470"/>
+              <a:defRPr sz="1654"/>
             </a:lvl5pPr>
             <a:lvl6pPr>
-              <a:defRPr sz="1470"/>
+              <a:defRPr sz="1654"/>
             </a:lvl6pPr>
             <a:lvl7pPr>
-              <a:defRPr sz="1470"/>
+              <a:defRPr sz="1654"/>
             </a:lvl7pPr>
             <a:lvl8pPr>
-              <a:defRPr sz="1470"/>
+              <a:defRPr sz="1654"/>
             </a:lvl8pPr>
             <a:lvl9pPr>
-              <a:defRPr sz="1470"/>
+              <a:defRPr sz="1654"/>
             </a:lvl9pPr>
           </a:lstStyle>
           <a:p>
@@ -2023,8 +2028,8 @@
         </p:nvSpPr>
         <p:spPr>
           <a:xfrm>
-            <a:off x="694356" y="1512094"/>
-            <a:ext cx="3251264" cy="2801341"/>
+            <a:off x="694356" y="1727835"/>
+            <a:ext cx="3251264" cy="3201028"/>
           </a:xfrm>
         </p:spPr>
         <p:txBody>
@@ -2032,39 +2037,39 @@
           <a:lstStyle>
             <a:lvl1pPr marL="0" indent="0">
               <a:buNone/>
-              <a:defRPr sz="1176"/>
+              <a:defRPr sz="1323"/>
             </a:lvl1pPr>
-            <a:lvl2pPr marL="336042" indent="0">
-              <a:buNone/>
-              <a:defRPr sz="1029"/>
+            <a:lvl2pPr marL="378013" indent="0">
+              <a:buNone/>
+              <a:defRPr sz="1158"/>
             </a:lvl2pPr>
-            <a:lvl3pPr marL="672084" indent="0">
-              <a:buNone/>
-              <a:defRPr sz="882"/>
+            <a:lvl3pPr marL="756026" indent="0">
+              <a:buNone/>
+              <a:defRPr sz="992"/>
             </a:lvl3pPr>
-            <a:lvl4pPr marL="1008126" indent="0">
-              <a:buNone/>
-              <a:defRPr sz="735"/>
+            <a:lvl4pPr marL="1134039" indent="0">
+              <a:buNone/>
+              <a:defRPr sz="827"/>
             </a:lvl4pPr>
-            <a:lvl5pPr marL="1344168" indent="0">
-              <a:buNone/>
-              <a:defRPr sz="735"/>
+            <a:lvl5pPr marL="1512052" indent="0">
+              <a:buNone/>
+              <a:defRPr sz="827"/>
             </a:lvl5pPr>
-            <a:lvl6pPr marL="1680210" indent="0">
-              <a:buNone/>
-              <a:defRPr sz="735"/>
+            <a:lvl6pPr marL="1890065" indent="0">
+              <a:buNone/>
+              <a:defRPr sz="827"/>
             </a:lvl6pPr>
-            <a:lvl7pPr marL="2016252" indent="0">
-              <a:buNone/>
-              <a:defRPr sz="735"/>
+            <a:lvl7pPr marL="2268078" indent="0">
+              <a:buNone/>
+              <a:defRPr sz="827"/>
             </a:lvl7pPr>
-            <a:lvl8pPr marL="2352294" indent="0">
-              <a:buNone/>
-              <a:defRPr sz="735"/>
+            <a:lvl8pPr marL="2646091" indent="0">
+              <a:buNone/>
+              <a:defRPr sz="827"/>
             </a:lvl8pPr>
-            <a:lvl9pPr marL="2688336" indent="0">
-              <a:buNone/>
-              <a:defRPr sz="735"/>
+            <a:lvl9pPr marL="3024104" indent="0">
+              <a:buNone/>
+              <a:defRPr sz="827"/>
             </a:lvl9pPr>
           </a:lstStyle>
           <a:p>
@@ -2144,7 +2149,7 @@
     </p:spTree>
     <p:extLst>
       <p:ext uri="{BB962C8B-B14F-4D97-AF65-F5344CB8AC3E}">
-        <p14:creationId xmlns:p14="http://schemas.microsoft.com/office/powerpoint/2010/main" val="1769710865"/>
+        <p14:creationId xmlns:p14="http://schemas.microsoft.com/office/powerpoint/2010/main" val="2736728034"/>
       </p:ext>
     </p:extLst>
   </p:cSld>
@@ -2183,15 +2188,15 @@
         </p:nvSpPr>
         <p:spPr>
           <a:xfrm>
-            <a:off x="694356" y="336021"/>
-            <a:ext cx="3251264" cy="1176073"/>
+            <a:off x="694356" y="383963"/>
+            <a:ext cx="3251264" cy="1343872"/>
           </a:xfrm>
         </p:spPr>
         <p:txBody>
           <a:bodyPr anchor="b"/>
           <a:lstStyle>
             <a:lvl1pPr>
-              <a:defRPr sz="2352"/>
+              <a:defRPr sz="2646"/>
             </a:lvl1pPr>
           </a:lstStyle>
           <a:p>
@@ -2215,8 +2220,8 @@
         </p:nvSpPr>
         <p:spPr>
           <a:xfrm>
-            <a:off x="4285579" y="725712"/>
-            <a:ext cx="5103316" cy="3581889"/>
+            <a:off x="4285579" y="829255"/>
+            <a:ext cx="5103316" cy="4092942"/>
           </a:xfrm>
         </p:spPr>
         <p:txBody>
@@ -2224,39 +2229,39 @@
           <a:lstStyle>
             <a:lvl1pPr marL="0" indent="0">
               <a:buNone/>
-              <a:defRPr sz="2352"/>
+              <a:defRPr sz="2646"/>
             </a:lvl1pPr>
-            <a:lvl2pPr marL="336042" indent="0">
-              <a:buNone/>
-              <a:defRPr sz="2058"/>
+            <a:lvl2pPr marL="378013" indent="0">
+              <a:buNone/>
+              <a:defRPr sz="2315"/>
             </a:lvl2pPr>
-            <a:lvl3pPr marL="672084" indent="0">
-              <a:buNone/>
-              <a:defRPr sz="1764"/>
+            <a:lvl3pPr marL="756026" indent="0">
+              <a:buNone/>
+              <a:defRPr sz="1984"/>
             </a:lvl3pPr>
-            <a:lvl4pPr marL="1008126" indent="0">
-              <a:buNone/>
-              <a:defRPr sz="1470"/>
+            <a:lvl4pPr marL="1134039" indent="0">
+              <a:buNone/>
+              <a:defRPr sz="1654"/>
             </a:lvl4pPr>
-            <a:lvl5pPr marL="1344168" indent="0">
-              <a:buNone/>
-              <a:defRPr sz="1470"/>
+            <a:lvl5pPr marL="1512052" indent="0">
+              <a:buNone/>
+              <a:defRPr sz="1654"/>
             </a:lvl5pPr>
-            <a:lvl6pPr marL="1680210" indent="0">
-              <a:buNone/>
-              <a:defRPr sz="1470"/>
+            <a:lvl6pPr marL="1890065" indent="0">
+              <a:buNone/>
+              <a:defRPr sz="1654"/>
             </a:lvl6pPr>
-            <a:lvl7pPr marL="2016252" indent="0">
-              <a:buNone/>
-              <a:defRPr sz="1470"/>
+            <a:lvl7pPr marL="2268078" indent="0">
+              <a:buNone/>
+              <a:defRPr sz="1654"/>
             </a:lvl7pPr>
-            <a:lvl8pPr marL="2352294" indent="0">
-              <a:buNone/>
-              <a:defRPr sz="1470"/>
+            <a:lvl8pPr marL="2646091" indent="0">
+              <a:buNone/>
+              <a:defRPr sz="1654"/>
             </a:lvl8pPr>
-            <a:lvl9pPr marL="2688336" indent="0">
-              <a:buNone/>
-              <a:defRPr sz="1470"/>
+            <a:lvl9pPr marL="3024104" indent="0">
+              <a:buNone/>
+              <a:defRPr sz="1654"/>
             </a:lvl9pPr>
           </a:lstStyle>
           <a:p>
@@ -2280,8 +2285,8 @@
         </p:nvSpPr>
         <p:spPr>
           <a:xfrm>
-            <a:off x="694356" y="1512094"/>
-            <a:ext cx="3251264" cy="2801341"/>
+            <a:off x="694356" y="1727835"/>
+            <a:ext cx="3251264" cy="3201028"/>
           </a:xfrm>
         </p:spPr>
         <p:txBody>
@@ -2289,39 +2294,39 @@
           <a:lstStyle>
             <a:lvl1pPr marL="0" indent="0">
               <a:buNone/>
-              <a:defRPr sz="1176"/>
+              <a:defRPr sz="1323"/>
             </a:lvl1pPr>
-            <a:lvl2pPr marL="336042" indent="0">
-              <a:buNone/>
-              <a:defRPr sz="1029"/>
+            <a:lvl2pPr marL="378013" indent="0">
+              <a:buNone/>
+              <a:defRPr sz="1158"/>
             </a:lvl2pPr>
-            <a:lvl3pPr marL="672084" indent="0">
-              <a:buNone/>
-              <a:defRPr sz="882"/>
+            <a:lvl3pPr marL="756026" indent="0">
+              <a:buNone/>
+              <a:defRPr sz="992"/>
             </a:lvl3pPr>
-            <a:lvl4pPr marL="1008126" indent="0">
-              <a:buNone/>
-              <a:defRPr sz="735"/>
+            <a:lvl4pPr marL="1134039" indent="0">
+              <a:buNone/>
+              <a:defRPr sz="827"/>
             </a:lvl4pPr>
-            <a:lvl5pPr marL="1344168" indent="0">
-              <a:buNone/>
-              <a:defRPr sz="735"/>
+            <a:lvl5pPr marL="1512052" indent="0">
+              <a:buNone/>
+              <a:defRPr sz="827"/>
             </a:lvl5pPr>
-            <a:lvl6pPr marL="1680210" indent="0">
-              <a:buNone/>
-              <a:defRPr sz="735"/>
+            <a:lvl6pPr marL="1890065" indent="0">
+              <a:buNone/>
+              <a:defRPr sz="827"/>
             </a:lvl6pPr>
-            <a:lvl7pPr marL="2016252" indent="0">
-              <a:buNone/>
-              <a:defRPr sz="735"/>
+            <a:lvl7pPr marL="2268078" indent="0">
+              <a:buNone/>
+              <a:defRPr sz="827"/>
             </a:lvl7pPr>
-            <a:lvl8pPr marL="2352294" indent="0">
-              <a:buNone/>
-              <a:defRPr sz="735"/>
+            <a:lvl8pPr marL="2646091" indent="0">
+              <a:buNone/>
+              <a:defRPr sz="827"/>
             </a:lvl8pPr>
-            <a:lvl9pPr marL="2688336" indent="0">
-              <a:buNone/>
-              <a:defRPr sz="735"/>
+            <a:lvl9pPr marL="3024104" indent="0">
+              <a:buNone/>
+              <a:defRPr sz="827"/>
             </a:lvl9pPr>
           </a:lstStyle>
           <a:p>
@@ -2401,7 +2406,7 @@
     </p:spTree>
     <p:extLst>
       <p:ext uri="{BB962C8B-B14F-4D97-AF65-F5344CB8AC3E}">
-        <p14:creationId xmlns:p14="http://schemas.microsoft.com/office/powerpoint/2010/main" val="3148905371"/>
+        <p14:creationId xmlns:p14="http://schemas.microsoft.com/office/powerpoint/2010/main" val="2989789491"/>
       </p:ext>
     </p:extLst>
   </p:cSld>
@@ -2445,8 +2450,8 @@
         </p:nvSpPr>
         <p:spPr>
           <a:xfrm>
-            <a:off x="693043" y="268350"/>
-            <a:ext cx="8694539" cy="974228"/>
+            <a:off x="693043" y="306638"/>
+            <a:ext cx="8694539" cy="1113227"/>
           </a:xfrm>
           <a:prstGeom prst="rect">
             <a:avLst/>
@@ -2478,8 +2483,8 @@
         </p:nvSpPr>
         <p:spPr>
           <a:xfrm>
-            <a:off x="693043" y="1341750"/>
-            <a:ext cx="8694539" cy="3198032"/>
+            <a:off x="693043" y="1533187"/>
+            <a:ext cx="8694539" cy="3654318"/>
           </a:xfrm>
           <a:prstGeom prst="rect">
             <a:avLst/>
@@ -2540,8 +2545,8 @@
         </p:nvSpPr>
         <p:spPr>
           <a:xfrm>
-            <a:off x="693043" y="4671624"/>
-            <a:ext cx="2268141" cy="268350"/>
+            <a:off x="693043" y="5338158"/>
+            <a:ext cx="2268141" cy="306637"/>
           </a:xfrm>
           <a:prstGeom prst="rect">
             <a:avLst/>
@@ -2551,7 +2556,7 @@
           <a:bodyPr vert="horz" lIns="91440" tIns="45720" rIns="91440" bIns="45720" rtlCol="0" anchor="ctr"/>
           <a:lstStyle>
             <a:lvl1pPr algn="l">
-              <a:defRPr sz="882">
+              <a:defRPr sz="992">
                 <a:solidFill>
                   <a:schemeClr val="tx1">
                     <a:tint val="75000"/>
@@ -2581,8 +2586,8 @@
         </p:nvSpPr>
         <p:spPr>
           <a:xfrm>
-            <a:off x="3339207" y="4671624"/>
-            <a:ext cx="3402211" cy="268350"/>
+            <a:off x="3339207" y="5338158"/>
+            <a:ext cx="3402211" cy="306637"/>
           </a:xfrm>
           <a:prstGeom prst="rect">
             <a:avLst/>
@@ -2592,7 +2597,7 @@
           <a:bodyPr vert="horz" lIns="91440" tIns="45720" rIns="91440" bIns="45720" rtlCol="0" anchor="ctr"/>
           <a:lstStyle>
             <a:lvl1pPr algn="ctr">
-              <a:defRPr sz="882">
+              <a:defRPr sz="992">
                 <a:solidFill>
                   <a:schemeClr val="tx1">
                     <a:tint val="75000"/>
@@ -2618,8 +2623,8 @@
         </p:nvSpPr>
         <p:spPr>
           <a:xfrm>
-            <a:off x="7119441" y="4671624"/>
-            <a:ext cx="2268141" cy="268350"/>
+            <a:off x="7119441" y="5338158"/>
+            <a:ext cx="2268141" cy="306637"/>
           </a:xfrm>
           <a:prstGeom prst="rect">
             <a:avLst/>
@@ -2629,7 +2634,7 @@
           <a:bodyPr vert="horz" lIns="91440" tIns="45720" rIns="91440" bIns="45720" rtlCol="0" anchor="ctr"/>
           <a:lstStyle>
             <a:lvl1pPr algn="r">
-              <a:defRPr sz="882">
+              <a:defRPr sz="992">
                 <a:solidFill>
                   <a:schemeClr val="tx1">
                     <a:tint val="75000"/>
@@ -2650,27 +2655,27 @@
     </p:spTree>
     <p:extLst>
       <p:ext uri="{BB962C8B-B14F-4D97-AF65-F5344CB8AC3E}">
-        <p14:creationId xmlns:p14="http://schemas.microsoft.com/office/powerpoint/2010/main" val="2009510187"/>
+        <p14:creationId xmlns:p14="http://schemas.microsoft.com/office/powerpoint/2010/main" val="670513310"/>
       </p:ext>
     </p:extLst>
   </p:cSld>
   <p:clrMap bg1="lt1" tx1="dk1" bg2="lt2" tx2="dk2" accent1="accent1" accent2="accent2" accent3="accent3" accent4="accent4" accent5="accent5" accent6="accent6" hlink="hlink" folHlink="folHlink"/>
   <p:sldLayoutIdLst>
-    <p:sldLayoutId id="2147483697" r:id="rId1"/>
-    <p:sldLayoutId id="2147483698" r:id="rId2"/>
-    <p:sldLayoutId id="2147483699" r:id="rId3"/>
-    <p:sldLayoutId id="2147483700" r:id="rId4"/>
-    <p:sldLayoutId id="2147483701" r:id="rId5"/>
-    <p:sldLayoutId id="2147483702" r:id="rId6"/>
-    <p:sldLayoutId id="2147483703" r:id="rId7"/>
-    <p:sldLayoutId id="2147483704" r:id="rId8"/>
-    <p:sldLayoutId id="2147483705" r:id="rId9"/>
-    <p:sldLayoutId id="2147483706" r:id="rId10"/>
-    <p:sldLayoutId id="2147483707" r:id="rId11"/>
+    <p:sldLayoutId id="2147483709" r:id="rId1"/>
+    <p:sldLayoutId id="2147483710" r:id="rId2"/>
+    <p:sldLayoutId id="2147483711" r:id="rId3"/>
+    <p:sldLayoutId id="2147483712" r:id="rId4"/>
+    <p:sldLayoutId id="2147483713" r:id="rId5"/>
+    <p:sldLayoutId id="2147483714" r:id="rId6"/>
+    <p:sldLayoutId id="2147483715" r:id="rId7"/>
+    <p:sldLayoutId id="2147483716" r:id="rId8"/>
+    <p:sldLayoutId id="2147483717" r:id="rId9"/>
+    <p:sldLayoutId id="2147483718" r:id="rId10"/>
+    <p:sldLayoutId id="2147483719" r:id="rId11"/>
   </p:sldLayoutIdLst>
   <p:txStyles>
     <p:titleStyle>
-      <a:lvl1pPr algn="l" defTabSz="672084" rtl="0" eaLnBrk="1" latinLnBrk="0" hangingPunct="1">
+      <a:lvl1pPr algn="l" defTabSz="756026" rtl="0" eaLnBrk="1" latinLnBrk="0" hangingPunct="1">
         <a:lnSpc>
           <a:spcPct val="90000"/>
         </a:lnSpc>
@@ -2678,7 +2683,7 @@
           <a:spcPct val="0"/>
         </a:spcBef>
         <a:buNone/>
-        <a:defRPr sz="3234" kern="1200">
+        <a:defRPr sz="3638" kern="1200">
           <a:solidFill>
             <a:schemeClr val="tx1"/>
           </a:solidFill>
@@ -2689,16 +2694,16 @@
       </a:lvl1pPr>
     </p:titleStyle>
     <p:bodyStyle>
-      <a:lvl1pPr marL="168021" indent="-168021" algn="l" defTabSz="672084" rtl="0" eaLnBrk="1" latinLnBrk="0" hangingPunct="1">
+      <a:lvl1pPr marL="189006" indent="-189006" algn="l" defTabSz="756026" rtl="0" eaLnBrk="1" latinLnBrk="0" hangingPunct="1">
         <a:lnSpc>
           <a:spcPct val="90000"/>
         </a:lnSpc>
         <a:spcBef>
-          <a:spcPts val="735"/>
+          <a:spcPts val="827"/>
         </a:spcBef>
         <a:buFont typeface="Arial" panose="020B0604020202020204" pitchFamily="34" charset="0"/>
         <a:buChar char="•"/>
-        <a:defRPr sz="2058" kern="1200">
+        <a:defRPr sz="2315" kern="1200">
           <a:solidFill>
             <a:schemeClr val="tx1"/>
           </a:solidFill>
@@ -2707,16 +2712,16 @@
           <a:cs typeface="+mn-cs"/>
         </a:defRPr>
       </a:lvl1pPr>
-      <a:lvl2pPr marL="504063" indent="-168021" algn="l" defTabSz="672084" rtl="0" eaLnBrk="1" latinLnBrk="0" hangingPunct="1">
+      <a:lvl2pPr marL="567019" indent="-189006" algn="l" defTabSz="756026" rtl="0" eaLnBrk="1" latinLnBrk="0" hangingPunct="1">
         <a:lnSpc>
           <a:spcPct val="90000"/>
         </a:lnSpc>
         <a:spcBef>
-          <a:spcPts val="368"/>
+          <a:spcPts val="413"/>
         </a:spcBef>
         <a:buFont typeface="Arial" panose="020B0604020202020204" pitchFamily="34" charset="0"/>
         <a:buChar char="•"/>
-        <a:defRPr sz="1764" kern="1200">
+        <a:defRPr sz="1984" kern="1200">
           <a:solidFill>
             <a:schemeClr val="tx1"/>
           </a:solidFill>
@@ -2725,16 +2730,16 @@
           <a:cs typeface="+mn-cs"/>
         </a:defRPr>
       </a:lvl2pPr>
-      <a:lvl3pPr marL="840105" indent="-168021" algn="l" defTabSz="672084" rtl="0" eaLnBrk="1" latinLnBrk="0" hangingPunct="1">
+      <a:lvl3pPr marL="945032" indent="-189006" algn="l" defTabSz="756026" rtl="0" eaLnBrk="1" latinLnBrk="0" hangingPunct="1">
         <a:lnSpc>
           <a:spcPct val="90000"/>
         </a:lnSpc>
         <a:spcBef>
-          <a:spcPts val="368"/>
+          <a:spcPts val="413"/>
         </a:spcBef>
         <a:buFont typeface="Arial" panose="020B0604020202020204" pitchFamily="34" charset="0"/>
         <a:buChar char="•"/>
-        <a:defRPr sz="1470" kern="1200">
+        <a:defRPr sz="1654" kern="1200">
           <a:solidFill>
             <a:schemeClr val="tx1"/>
           </a:solidFill>
@@ -2743,16 +2748,16 @@
           <a:cs typeface="+mn-cs"/>
         </a:defRPr>
       </a:lvl3pPr>
-      <a:lvl4pPr marL="1176147" indent="-168021" algn="l" defTabSz="672084" rtl="0" eaLnBrk="1" latinLnBrk="0" hangingPunct="1">
+      <a:lvl4pPr marL="1323045" indent="-189006" algn="l" defTabSz="756026" rtl="0" eaLnBrk="1" latinLnBrk="0" hangingPunct="1">
         <a:lnSpc>
           <a:spcPct val="90000"/>
         </a:lnSpc>
         <a:spcBef>
-          <a:spcPts val="368"/>
+          <a:spcPts val="413"/>
         </a:spcBef>
         <a:buFont typeface="Arial" panose="020B0604020202020204" pitchFamily="34" charset="0"/>
         <a:buChar char="•"/>
-        <a:defRPr sz="1323" kern="1200">
+        <a:defRPr sz="1488" kern="1200">
           <a:solidFill>
             <a:schemeClr val="tx1"/>
           </a:solidFill>
@@ -2761,16 +2766,16 @@
           <a:cs typeface="+mn-cs"/>
         </a:defRPr>
       </a:lvl4pPr>
-      <a:lvl5pPr marL="1512189" indent="-168021" algn="l" defTabSz="672084" rtl="0" eaLnBrk="1" latinLnBrk="0" hangingPunct="1">
+      <a:lvl5pPr marL="1701058" indent="-189006" algn="l" defTabSz="756026" rtl="0" eaLnBrk="1" latinLnBrk="0" hangingPunct="1">
         <a:lnSpc>
           <a:spcPct val="90000"/>
         </a:lnSpc>
         <a:spcBef>
-          <a:spcPts val="368"/>
+          <a:spcPts val="413"/>
         </a:spcBef>
         <a:buFont typeface="Arial" panose="020B0604020202020204" pitchFamily="34" charset="0"/>
         <a:buChar char="•"/>
-        <a:defRPr sz="1323" kern="1200">
+        <a:defRPr sz="1488" kern="1200">
           <a:solidFill>
             <a:schemeClr val="tx1"/>
           </a:solidFill>
@@ -2779,16 +2784,16 @@
           <a:cs typeface="+mn-cs"/>
         </a:defRPr>
       </a:lvl5pPr>
-      <a:lvl6pPr marL="1848231" indent="-168021" algn="l" defTabSz="672084" rtl="0" eaLnBrk="1" latinLnBrk="0" hangingPunct="1">
+      <a:lvl6pPr marL="2079071" indent="-189006" algn="l" defTabSz="756026" rtl="0" eaLnBrk="1" latinLnBrk="0" hangingPunct="1">
         <a:lnSpc>
           <a:spcPct val="90000"/>
         </a:lnSpc>
         <a:spcBef>
-          <a:spcPts val="368"/>
+          <a:spcPts val="413"/>
         </a:spcBef>
         <a:buFont typeface="Arial" panose="020B0604020202020204" pitchFamily="34" charset="0"/>
         <a:buChar char="•"/>
-        <a:defRPr sz="1323" kern="1200">
+        <a:defRPr sz="1488" kern="1200">
           <a:solidFill>
             <a:schemeClr val="tx1"/>
           </a:solidFill>
@@ -2797,16 +2802,16 @@
           <a:cs typeface="+mn-cs"/>
         </a:defRPr>
       </a:lvl6pPr>
-      <a:lvl7pPr marL="2184273" indent="-168021" algn="l" defTabSz="672084" rtl="0" eaLnBrk="1" latinLnBrk="0" hangingPunct="1">
+      <a:lvl7pPr marL="2457084" indent="-189006" algn="l" defTabSz="756026" rtl="0" eaLnBrk="1" latinLnBrk="0" hangingPunct="1">
         <a:lnSpc>
           <a:spcPct val="90000"/>
         </a:lnSpc>
         <a:spcBef>
-          <a:spcPts val="368"/>
+          <a:spcPts val="413"/>
         </a:spcBef>
         <a:buFont typeface="Arial" panose="020B0604020202020204" pitchFamily="34" charset="0"/>
         <a:buChar char="•"/>
-        <a:defRPr sz="1323" kern="1200">
+        <a:defRPr sz="1488" kern="1200">
           <a:solidFill>
             <a:schemeClr val="tx1"/>
           </a:solidFill>
@@ -2815,16 +2820,16 @@
           <a:cs typeface="+mn-cs"/>
         </a:defRPr>
       </a:lvl7pPr>
-      <a:lvl8pPr marL="2520315" indent="-168021" algn="l" defTabSz="672084" rtl="0" eaLnBrk="1" latinLnBrk="0" hangingPunct="1">
+      <a:lvl8pPr marL="2835097" indent="-189006" algn="l" defTabSz="756026" rtl="0" eaLnBrk="1" latinLnBrk="0" hangingPunct="1">
         <a:lnSpc>
           <a:spcPct val="90000"/>
         </a:lnSpc>
         <a:spcBef>
-          <a:spcPts val="368"/>
+          <a:spcPts val="413"/>
         </a:spcBef>
         <a:buFont typeface="Arial" panose="020B0604020202020204" pitchFamily="34" charset="0"/>
         <a:buChar char="•"/>
-        <a:defRPr sz="1323" kern="1200">
+        <a:defRPr sz="1488" kern="1200">
           <a:solidFill>
             <a:schemeClr val="tx1"/>
           </a:solidFill>
@@ -2833,16 +2838,16 @@
           <a:cs typeface="+mn-cs"/>
         </a:defRPr>
       </a:lvl8pPr>
-      <a:lvl9pPr marL="2856357" indent="-168021" algn="l" defTabSz="672084" rtl="0" eaLnBrk="1" latinLnBrk="0" hangingPunct="1">
+      <a:lvl9pPr marL="3213110" indent="-189006" algn="l" defTabSz="756026" rtl="0" eaLnBrk="1" latinLnBrk="0" hangingPunct="1">
         <a:lnSpc>
           <a:spcPct val="90000"/>
         </a:lnSpc>
         <a:spcBef>
-          <a:spcPts val="368"/>
+          <a:spcPts val="413"/>
         </a:spcBef>
         <a:buFont typeface="Arial" panose="020B0604020202020204" pitchFamily="34" charset="0"/>
         <a:buChar char="•"/>
-        <a:defRPr sz="1323" kern="1200">
+        <a:defRPr sz="1488" kern="1200">
           <a:solidFill>
             <a:schemeClr val="tx1"/>
           </a:solidFill>
@@ -2856,8 +2861,8 @@
       <a:defPPr>
         <a:defRPr lang="en-US"/>
       </a:defPPr>
-      <a:lvl1pPr marL="0" algn="l" defTabSz="672084" rtl="0" eaLnBrk="1" latinLnBrk="0" hangingPunct="1">
-        <a:defRPr sz="1323" kern="1200">
+      <a:lvl1pPr marL="0" algn="l" defTabSz="756026" rtl="0" eaLnBrk="1" latinLnBrk="0" hangingPunct="1">
+        <a:defRPr sz="1488" kern="1200">
           <a:solidFill>
             <a:schemeClr val="tx1"/>
           </a:solidFill>
@@ -2866,8 +2871,8 @@
           <a:cs typeface="+mn-cs"/>
         </a:defRPr>
       </a:lvl1pPr>
-      <a:lvl2pPr marL="336042" algn="l" defTabSz="672084" rtl="0" eaLnBrk="1" latinLnBrk="0" hangingPunct="1">
-        <a:defRPr sz="1323" kern="1200">
+      <a:lvl2pPr marL="378013" algn="l" defTabSz="756026" rtl="0" eaLnBrk="1" latinLnBrk="0" hangingPunct="1">
+        <a:defRPr sz="1488" kern="1200">
           <a:solidFill>
             <a:schemeClr val="tx1"/>
           </a:solidFill>
@@ -2876,8 +2881,8 @@
           <a:cs typeface="+mn-cs"/>
         </a:defRPr>
       </a:lvl2pPr>
-      <a:lvl3pPr marL="672084" algn="l" defTabSz="672084" rtl="0" eaLnBrk="1" latinLnBrk="0" hangingPunct="1">
-        <a:defRPr sz="1323" kern="1200">
+      <a:lvl3pPr marL="756026" algn="l" defTabSz="756026" rtl="0" eaLnBrk="1" latinLnBrk="0" hangingPunct="1">
+        <a:defRPr sz="1488" kern="1200">
           <a:solidFill>
             <a:schemeClr val="tx1"/>
           </a:solidFill>
@@ -2886,8 +2891,8 @@
           <a:cs typeface="+mn-cs"/>
         </a:defRPr>
       </a:lvl3pPr>
-      <a:lvl4pPr marL="1008126" algn="l" defTabSz="672084" rtl="0" eaLnBrk="1" latinLnBrk="0" hangingPunct="1">
-        <a:defRPr sz="1323" kern="1200">
+      <a:lvl4pPr marL="1134039" algn="l" defTabSz="756026" rtl="0" eaLnBrk="1" latinLnBrk="0" hangingPunct="1">
+        <a:defRPr sz="1488" kern="1200">
           <a:solidFill>
             <a:schemeClr val="tx1"/>
           </a:solidFill>
@@ -2896,8 +2901,8 @@
           <a:cs typeface="+mn-cs"/>
         </a:defRPr>
       </a:lvl4pPr>
-      <a:lvl5pPr marL="1344168" algn="l" defTabSz="672084" rtl="0" eaLnBrk="1" latinLnBrk="0" hangingPunct="1">
-        <a:defRPr sz="1323" kern="1200">
+      <a:lvl5pPr marL="1512052" algn="l" defTabSz="756026" rtl="0" eaLnBrk="1" latinLnBrk="0" hangingPunct="1">
+        <a:defRPr sz="1488" kern="1200">
           <a:solidFill>
             <a:schemeClr val="tx1"/>
           </a:solidFill>
@@ -2906,8 +2911,8 @@
           <a:cs typeface="+mn-cs"/>
         </a:defRPr>
       </a:lvl5pPr>
-      <a:lvl6pPr marL="1680210" algn="l" defTabSz="672084" rtl="0" eaLnBrk="1" latinLnBrk="0" hangingPunct="1">
-        <a:defRPr sz="1323" kern="1200">
+      <a:lvl6pPr marL="1890065" algn="l" defTabSz="756026" rtl="0" eaLnBrk="1" latinLnBrk="0" hangingPunct="1">
+        <a:defRPr sz="1488" kern="1200">
           <a:solidFill>
             <a:schemeClr val="tx1"/>
           </a:solidFill>
@@ -2916,8 +2921,8 @@
           <a:cs typeface="+mn-cs"/>
         </a:defRPr>
       </a:lvl6pPr>
-      <a:lvl7pPr marL="2016252" algn="l" defTabSz="672084" rtl="0" eaLnBrk="1" latinLnBrk="0" hangingPunct="1">
-        <a:defRPr sz="1323" kern="1200">
+      <a:lvl7pPr marL="2268078" algn="l" defTabSz="756026" rtl="0" eaLnBrk="1" latinLnBrk="0" hangingPunct="1">
+        <a:defRPr sz="1488" kern="1200">
           <a:solidFill>
             <a:schemeClr val="tx1"/>
           </a:solidFill>
@@ -2926,8 +2931,8 @@
           <a:cs typeface="+mn-cs"/>
         </a:defRPr>
       </a:lvl7pPr>
-      <a:lvl8pPr marL="2352294" algn="l" defTabSz="672084" rtl="0" eaLnBrk="1" latinLnBrk="0" hangingPunct="1">
-        <a:defRPr sz="1323" kern="1200">
+      <a:lvl8pPr marL="2646091" algn="l" defTabSz="756026" rtl="0" eaLnBrk="1" latinLnBrk="0" hangingPunct="1">
+        <a:defRPr sz="1488" kern="1200">
           <a:solidFill>
             <a:schemeClr val="tx1"/>
           </a:solidFill>
@@ -2936,8 +2941,8 @@
           <a:cs typeface="+mn-cs"/>
         </a:defRPr>
       </a:lvl8pPr>
-      <a:lvl9pPr marL="2688336" algn="l" defTabSz="672084" rtl="0" eaLnBrk="1" latinLnBrk="0" hangingPunct="1">
-        <a:defRPr sz="1323" kern="1200">
+      <a:lvl9pPr marL="3024104" algn="l" defTabSz="756026" rtl="0" eaLnBrk="1" latinLnBrk="0" hangingPunct="1">
+        <a:defRPr sz="1488" kern="1200">
           <a:solidFill>
             <a:schemeClr val="tx1"/>
           </a:solidFill>
@@ -2991,7 +2996,7 @@
         </p:blipFill>
         <p:spPr>
           <a:xfrm>
-            <a:off x="6891421" y="43620"/>
+            <a:off x="6891421" y="276190"/>
             <a:ext cx="3189204" cy="1837677"/>
           </a:xfrm>
           <a:prstGeom prst="rect">
@@ -3022,7 +3027,7 @@
         </p:blipFill>
         <p:spPr>
           <a:xfrm>
-            <a:off x="126127" y="1900179"/>
+            <a:off x="126128" y="2513750"/>
             <a:ext cx="4335301" cy="3124453"/>
           </a:xfrm>
           <a:prstGeom prst="rect">
@@ -3053,7 +3058,7 @@
         </p:blipFill>
         <p:spPr>
           <a:xfrm>
-            <a:off x="0" y="43618"/>
+            <a:off x="0" y="276188"/>
             <a:ext cx="7007460" cy="1913041"/>
           </a:xfrm>
           <a:prstGeom prst="rect">
@@ -3083,7 +3088,7 @@
         </p:blipFill>
         <p:spPr>
           <a:xfrm>
-            <a:off x="4619691" y="2051478"/>
+            <a:off x="4619691" y="2665048"/>
             <a:ext cx="5466484" cy="2973150"/>
           </a:xfrm>
           <a:prstGeom prst="rect">
@@ -3105,7 +3110,7 @@
         </p:nvSpPr>
         <p:spPr>
           <a:xfrm>
-            <a:off x="4261666" y="3273244"/>
+            <a:off x="4261666" y="3886815"/>
             <a:ext cx="557784" cy="392999"/>
           </a:xfrm>
           <a:prstGeom prst="notchedRightArrow">
@@ -3162,8 +3167,8 @@
         </p:nvSpPr>
         <p:spPr>
           <a:xfrm rot="5400000">
-            <a:off x="5466392" y="1776041"/>
-            <a:ext cx="420062" cy="392999"/>
+            <a:off x="5372967" y="2296187"/>
+            <a:ext cx="606912" cy="392999"/>
           </a:xfrm>
           <a:prstGeom prst="notchedRightArrow">
             <a:avLst>
@@ -3219,8 +3224,8 @@
         </p:nvSpPr>
         <p:spPr>
           <a:xfrm>
-            <a:off x="8303324" y="1794041"/>
-            <a:ext cx="546538" cy="420063"/>
+            <a:off x="8303324" y="2113868"/>
+            <a:ext cx="546538" cy="713808"/>
           </a:xfrm>
           <a:prstGeom prst="upArrow">
             <a:avLst>

</xml_diff>